<commit_message>
Kevin's About Page slide
</commit_message>
<xml_diff>
--- a/Presentation/About Page slide.pptx
+++ b/Presentation/About Page slide.pptx
@@ -6,6 +6,7 @@
   </p:sldMasterIdLst>
   <p:sldIdLst>
     <p:sldId id="257" r:id="rId2"/>
+    <p:sldId id="258" r:id="rId3"/>
   </p:sldIdLst>
   <p:sldSz cx="9144000" cy="6858000" type="screen4x3"/>
   <p:notesSz cx="6858000" cy="9144000"/>
@@ -189,11 +190,11 @@
           <c:showBubbleSize val="0"/>
         </c:dLbls>
         <c:gapWidth val="150"/>
-        <c:axId val="37161984"/>
-        <c:axId val="37163776"/>
+        <c:axId val="88942848"/>
+        <c:axId val="89093248"/>
       </c:barChart>
       <c:catAx>
-        <c:axId val="37161984"/>
+        <c:axId val="88942848"/>
         <c:scaling>
           <c:orientation val="minMax"/>
         </c:scaling>
@@ -203,7 +204,7 @@
         <c:majorTickMark val="out"/>
         <c:minorTickMark val="none"/>
         <c:tickLblPos val="nextTo"/>
-        <c:crossAx val="37163776"/>
+        <c:crossAx val="89093248"/>
         <c:crosses val="autoZero"/>
         <c:auto val="1"/>
         <c:lblAlgn val="ctr"/>
@@ -211,7 +212,7 @@
         <c:noMultiLvlLbl val="0"/>
       </c:catAx>
       <c:valAx>
-        <c:axId val="37163776"/>
+        <c:axId val="89093248"/>
         <c:scaling>
           <c:orientation val="minMax"/>
         </c:scaling>
@@ -222,7 +223,7 @@
         <c:majorTickMark val="out"/>
         <c:minorTickMark val="none"/>
         <c:tickLblPos val="nextTo"/>
-        <c:crossAx val="37161984"/>
+        <c:crossAx val="88942848"/>
         <c:crosses val="autoZero"/>
         <c:crossBetween val="between"/>
         <c:majorUnit val="1"/>
@@ -419,7 +420,7 @@
           <a:p>
             <a:fld id="{D491E474-BD87-4AD1-84BA-5FFCA1F5A666}" type="datetimeFigureOut">
               <a:rPr lang="en-GB" smtClean="0"/>
-              <a:t>23/04/2015</a:t>
+              <a:t>28/04/2015</a:t>
             </a:fld>
             <a:endParaRPr lang="en-GB"/>
           </a:p>
@@ -589,7 +590,7 @@
           <a:p>
             <a:fld id="{D491E474-BD87-4AD1-84BA-5FFCA1F5A666}" type="datetimeFigureOut">
               <a:rPr lang="en-GB" smtClean="0"/>
-              <a:t>23/04/2015</a:t>
+              <a:t>28/04/2015</a:t>
             </a:fld>
             <a:endParaRPr lang="en-GB"/>
           </a:p>
@@ -769,7 +770,7 @@
           <a:p>
             <a:fld id="{D491E474-BD87-4AD1-84BA-5FFCA1F5A666}" type="datetimeFigureOut">
               <a:rPr lang="en-GB" smtClean="0"/>
-              <a:t>23/04/2015</a:t>
+              <a:t>28/04/2015</a:t>
             </a:fld>
             <a:endParaRPr lang="en-GB"/>
           </a:p>
@@ -939,7 +940,7 @@
           <a:p>
             <a:fld id="{D491E474-BD87-4AD1-84BA-5FFCA1F5A666}" type="datetimeFigureOut">
               <a:rPr lang="en-GB" smtClean="0"/>
-              <a:t>23/04/2015</a:t>
+              <a:t>28/04/2015</a:t>
             </a:fld>
             <a:endParaRPr lang="en-GB"/>
           </a:p>
@@ -1185,7 +1186,7 @@
           <a:p>
             <a:fld id="{D491E474-BD87-4AD1-84BA-5FFCA1F5A666}" type="datetimeFigureOut">
               <a:rPr lang="en-GB" smtClean="0"/>
-              <a:t>23/04/2015</a:t>
+              <a:t>28/04/2015</a:t>
             </a:fld>
             <a:endParaRPr lang="en-GB"/>
           </a:p>
@@ -1473,7 +1474,7 @@
           <a:p>
             <a:fld id="{D491E474-BD87-4AD1-84BA-5FFCA1F5A666}" type="datetimeFigureOut">
               <a:rPr lang="en-GB" smtClean="0"/>
-              <a:t>23/04/2015</a:t>
+              <a:t>28/04/2015</a:t>
             </a:fld>
             <a:endParaRPr lang="en-GB"/>
           </a:p>
@@ -1895,7 +1896,7 @@
           <a:p>
             <a:fld id="{D491E474-BD87-4AD1-84BA-5FFCA1F5A666}" type="datetimeFigureOut">
               <a:rPr lang="en-GB" smtClean="0"/>
-              <a:t>23/04/2015</a:t>
+              <a:t>28/04/2015</a:t>
             </a:fld>
             <a:endParaRPr lang="en-GB"/>
           </a:p>
@@ -2013,7 +2014,7 @@
           <a:p>
             <a:fld id="{D491E474-BD87-4AD1-84BA-5FFCA1F5A666}" type="datetimeFigureOut">
               <a:rPr lang="en-GB" smtClean="0"/>
-              <a:t>23/04/2015</a:t>
+              <a:t>28/04/2015</a:t>
             </a:fld>
             <a:endParaRPr lang="en-GB"/>
           </a:p>
@@ -2108,7 +2109,7 @@
           <a:p>
             <a:fld id="{D491E474-BD87-4AD1-84BA-5FFCA1F5A666}" type="datetimeFigureOut">
               <a:rPr lang="en-GB" smtClean="0"/>
-              <a:t>23/04/2015</a:t>
+              <a:t>28/04/2015</a:t>
             </a:fld>
             <a:endParaRPr lang="en-GB"/>
           </a:p>
@@ -2385,7 +2386,7 @@
           <a:p>
             <a:fld id="{D491E474-BD87-4AD1-84BA-5FFCA1F5A666}" type="datetimeFigureOut">
               <a:rPr lang="en-GB" smtClean="0"/>
-              <a:t>23/04/2015</a:t>
+              <a:t>28/04/2015</a:t>
             </a:fld>
             <a:endParaRPr lang="en-GB"/>
           </a:p>
@@ -2638,7 +2639,7 @@
           <a:p>
             <a:fld id="{D491E474-BD87-4AD1-84BA-5FFCA1F5A666}" type="datetimeFigureOut">
               <a:rPr lang="en-GB" smtClean="0"/>
-              <a:t>23/04/2015</a:t>
+              <a:t>28/04/2015</a:t>
             </a:fld>
             <a:endParaRPr lang="en-GB"/>
           </a:p>
@@ -2851,7 +2852,7 @@
           <a:p>
             <a:fld id="{D491E474-BD87-4AD1-84BA-5FFCA1F5A666}" type="datetimeFigureOut">
               <a:rPr lang="en-GB" smtClean="0"/>
-              <a:t>23/04/2015</a:t>
+              <a:t>28/04/2015</a:t>
             </a:fld>
             <a:endParaRPr lang="en-GB"/>
           </a:p>
@@ -3243,7 +3244,7 @@
           <a:p>
             <a:r>
               <a:rPr lang="en-GB" dirty="0" smtClean="0"/>
-              <a:t>About Page</a:t>
+              <a:t>About</a:t>
             </a:r>
             <a:endParaRPr lang="en-GB" dirty="0"/>
           </a:p>
@@ -3315,11 +3316,13 @@
       </p:graphicFrame>
       <p:pic>
         <p:nvPicPr>
-          <p:cNvPr id="5" name="Picture 4"/>
-          <p:cNvPicPr/>
+          <p:cNvPr id="1026" name="Picture 2"/>
+          <p:cNvPicPr>
+            <a:picLocks noChangeAspect="1" noChangeArrowheads="1"/>
+          </p:cNvPicPr>
           <p:nvPr/>
         </p:nvPicPr>
-        <p:blipFill>
+        <p:blipFill rotWithShape="1">
           <a:blip r:embed="rId3">
             <a:extLst>
               <a:ext uri="{28A0092B-C50C-407E-A947-70E740481C1C}">
@@ -3327,20 +3330,162 @@
               </a:ext>
             </a:extLst>
           </a:blip>
-          <a:stretch>
-            <a:fillRect/>
-          </a:stretch>
+          <a:srcRect l="5243" t="13889" r="54375" b="41666"/>
+          <a:stretch/>
         </p:blipFill>
-        <p:spPr>
+        <p:spPr bwMode="auto">
           <a:xfrm>
-            <a:off x="5580112" y="4077072"/>
-            <a:ext cx="2659380" cy="1057910"/>
+            <a:off x="5124274" y="3717032"/>
+            <a:ext cx="3840214" cy="2376264"/>
           </a:xfrm>
           <a:prstGeom prst="rect">
             <a:avLst/>
           </a:prstGeom>
+          <a:noFill/>
+          <a:ln>
+            <a:noFill/>
+          </a:ln>
+          <a:extLst>
+            <a:ext uri="{909E8E84-426E-40DD-AFC4-6F175D3DCCD1}">
+              <a14:hiddenFill xmlns:a14="http://schemas.microsoft.com/office/drawing/2010/main">
+                <a:solidFill>
+                  <a:schemeClr val="accent1"/>
+                </a:solidFill>
+              </a14:hiddenFill>
+            </a:ext>
+            <a:ext uri="{91240B29-F687-4F45-9708-019B960494DF}">
+              <a14:hiddenLine xmlns:a14="http://schemas.microsoft.com/office/drawing/2010/main" w="9525">
+                <a:solidFill>
+                  <a:schemeClr val="tx1"/>
+                </a:solidFill>
+                <a:miter lim="800000"/>
+                <a:headEnd/>
+                <a:tailEnd/>
+              </a14:hiddenLine>
+            </a:ext>
+          </a:extLst>
         </p:spPr>
       </p:pic>
+      <p:sp>
+        <p:nvSpPr>
+          <p:cNvPr id="6" name="Oval 5"/>
+          <p:cNvSpPr/>
+          <p:nvPr/>
+        </p:nvSpPr>
+        <p:spPr>
+          <a:xfrm>
+            <a:off x="5124274" y="4725144"/>
+            <a:ext cx="1103910" cy="504056"/>
+          </a:xfrm>
+          <a:prstGeom prst="ellipse">
+            <a:avLst/>
+          </a:prstGeom>
+          <a:noFill/>
+          <a:ln>
+            <a:solidFill>
+              <a:srgbClr val="FF0000"/>
+            </a:solidFill>
+          </a:ln>
+        </p:spPr>
+        <p:style>
+          <a:lnRef idx="2">
+            <a:schemeClr val="accent1">
+              <a:shade val="50000"/>
+            </a:schemeClr>
+          </a:lnRef>
+          <a:fillRef idx="1">
+            <a:schemeClr val="accent1"/>
+          </a:fillRef>
+          <a:effectRef idx="0">
+            <a:schemeClr val="accent1"/>
+          </a:effectRef>
+          <a:fontRef idx="minor">
+            <a:schemeClr val="lt1"/>
+          </a:fontRef>
+        </p:style>
+        <p:txBody>
+          <a:bodyPr rtlCol="0" anchor="ctr"/>
+          <a:lstStyle/>
+          <a:p>
+            <a:pPr algn="ctr"/>
+            <a:endParaRPr lang="en-GB"/>
+          </a:p>
+        </p:txBody>
+      </p:sp>
+      <p:cxnSp>
+        <p:nvCxnSpPr>
+          <p:cNvPr id="8" name="Straight Arrow Connector 7"/>
+          <p:cNvCxnSpPr/>
+          <p:nvPr/>
+        </p:nvCxnSpPr>
+        <p:spPr>
+          <a:xfrm flipH="1">
+            <a:off x="5796136" y="2924944"/>
+            <a:ext cx="1872208" cy="1800200"/>
+          </a:xfrm>
+          <a:prstGeom prst="straightConnector1">
+            <a:avLst/>
+          </a:prstGeom>
+          <a:ln w="25400">
+            <a:solidFill>
+              <a:srgbClr val="FF0000"/>
+            </a:solidFill>
+            <a:tailEnd type="arrow"/>
+          </a:ln>
+        </p:spPr>
+        <p:style>
+          <a:lnRef idx="1">
+            <a:schemeClr val="accent1"/>
+          </a:lnRef>
+          <a:fillRef idx="0">
+            <a:schemeClr val="accent1"/>
+          </a:fillRef>
+          <a:effectRef idx="0">
+            <a:schemeClr val="accent1"/>
+          </a:effectRef>
+          <a:fontRef idx="minor">
+            <a:schemeClr val="tx1"/>
+          </a:fontRef>
+        </p:style>
+      </p:cxnSp>
+      <p:sp>
+        <p:nvSpPr>
+          <p:cNvPr id="9" name="TextBox 8"/>
+          <p:cNvSpPr txBox="1"/>
+          <p:nvPr/>
+        </p:nvSpPr>
+        <p:spPr>
+          <a:xfrm>
+            <a:off x="7308304" y="2541921"/>
+            <a:ext cx="1368152" cy="369332"/>
+          </a:xfrm>
+          <a:prstGeom prst="rect">
+            <a:avLst/>
+          </a:prstGeom>
+          <a:noFill/>
+        </p:spPr>
+        <p:txBody>
+          <a:bodyPr wrap="square" rtlCol="0">
+            <a:spAutoFit/>
+          </a:bodyPr>
+          <a:lstStyle/>
+          <a:p>
+            <a:r>
+              <a:rPr lang="en-GB" dirty="0" smtClean="0">
+                <a:solidFill>
+                  <a:srgbClr val="FF0000"/>
+                </a:solidFill>
+              </a:rPr>
+              <a:t>Missing Title</a:t>
+            </a:r>
+            <a:endParaRPr lang="en-GB" dirty="0">
+              <a:solidFill>
+                <a:srgbClr val="FF0000"/>
+              </a:solidFill>
+            </a:endParaRPr>
+          </a:p>
+        </p:txBody>
+      </p:sp>
     </p:spTree>
     <p:extLst>
       <p:ext uri="{BB962C8B-B14F-4D97-AF65-F5344CB8AC3E}">
@@ -3351,6 +3496,422 @@
   <p:clrMapOvr>
     <a:masterClrMapping/>
   </p:clrMapOvr>
+  <p:timing>
+    <p:tnLst>
+      <p:par>
+        <p:cTn id="1" dur="indefinite" restart="never" nodeType="tmRoot"/>
+      </p:par>
+    </p:tnLst>
+  </p:timing>
+</p:sld>
+</file>
+
+<file path=ppt/slides/slide2.xml><?xml version="1.0" encoding="utf-8"?>
+<p:sld xmlns:a="http://schemas.openxmlformats.org/drawingml/2006/main" xmlns:r="http://schemas.openxmlformats.org/officeDocument/2006/relationships" xmlns:p="http://schemas.openxmlformats.org/presentationml/2006/main">
+  <p:cSld>
+    <p:spTree>
+      <p:nvGrpSpPr>
+        <p:cNvPr id="1" name=""/>
+        <p:cNvGrpSpPr/>
+        <p:nvPr/>
+      </p:nvGrpSpPr>
+      <p:grpSpPr>
+        <a:xfrm>
+          <a:off x="0" y="0"/>
+          <a:ext cx="0" cy="0"/>
+          <a:chOff x="0" y="0"/>
+          <a:chExt cx="0" cy="0"/>
+        </a:xfrm>
+      </p:grpSpPr>
+      <p:sp>
+        <p:nvSpPr>
+          <p:cNvPr id="2" name="Title 1"/>
+          <p:cNvSpPr>
+            <a:spLocks noGrp="1"/>
+          </p:cNvSpPr>
+          <p:nvPr>
+            <p:ph type="title"/>
+          </p:nvPr>
+        </p:nvSpPr>
+        <p:spPr/>
+        <p:txBody>
+          <a:bodyPr/>
+          <a:lstStyle/>
+          <a:p>
+            <a:r>
+              <a:rPr lang="en-GB" dirty="0" smtClean="0"/>
+              <a:t>About</a:t>
+            </a:r>
+            <a:endParaRPr lang="en-GB" dirty="0"/>
+          </a:p>
+        </p:txBody>
+      </p:sp>
+      <p:grpSp>
+        <p:nvGrpSpPr>
+          <p:cNvPr id="3" name="Group 2"/>
+          <p:cNvGrpSpPr/>
+          <p:nvPr/>
+        </p:nvGrpSpPr>
+        <p:grpSpPr>
+          <a:xfrm>
+            <a:off x="323526" y="2489722"/>
+            <a:ext cx="3919945" cy="3365846"/>
+            <a:chOff x="323528" y="1268760"/>
+            <a:chExt cx="3919945" cy="3365846"/>
+          </a:xfrm>
+        </p:grpSpPr>
+        <p:pic>
+          <p:nvPicPr>
+            <p:cNvPr id="2050" name="Picture 2"/>
+            <p:cNvPicPr>
+              <a:picLocks noChangeAspect="1" noChangeArrowheads="1"/>
+            </p:cNvPicPr>
+            <p:nvPr/>
+          </p:nvPicPr>
+          <p:blipFill rotWithShape="1">
+            <a:blip r:embed="rId2">
+              <a:extLst>
+                <a:ext uri="{28A0092B-C50C-407E-A947-70E740481C1C}">
+                  <a14:useLocalDpi xmlns:a14="http://schemas.microsoft.com/office/drawing/2010/main" val="0"/>
+                </a:ext>
+              </a:extLst>
+            </a:blip>
+            <a:srcRect l="65593" t="42262" r="12028" b="30429"/>
+            <a:stretch/>
+          </p:blipFill>
+          <p:spPr bwMode="auto">
+            <a:xfrm>
+              <a:off x="1331640" y="2636912"/>
+              <a:ext cx="2911833" cy="1997694"/>
+            </a:xfrm>
+            <a:prstGeom prst="rect">
+              <a:avLst/>
+            </a:prstGeom>
+            <a:noFill/>
+            <a:ln>
+              <a:noFill/>
+            </a:ln>
+            <a:extLst>
+              <a:ext uri="{909E8E84-426E-40DD-AFC4-6F175D3DCCD1}">
+                <a14:hiddenFill xmlns:a14="http://schemas.microsoft.com/office/drawing/2010/main">
+                  <a:solidFill>
+                    <a:schemeClr val="accent1"/>
+                  </a:solidFill>
+                </a14:hiddenFill>
+              </a:ext>
+              <a:ext uri="{91240B29-F687-4F45-9708-019B960494DF}">
+                <a14:hiddenLine xmlns:a14="http://schemas.microsoft.com/office/drawing/2010/main" w="9525">
+                  <a:solidFill>
+                    <a:schemeClr val="tx1"/>
+                  </a:solidFill>
+                  <a:miter lim="800000"/>
+                  <a:headEnd/>
+                  <a:tailEnd/>
+                </a14:hiddenLine>
+              </a:ext>
+            </a:extLst>
+          </p:spPr>
+        </p:pic>
+        <p:pic>
+          <p:nvPicPr>
+            <p:cNvPr id="5" name="Picture 2"/>
+            <p:cNvPicPr>
+              <a:picLocks noChangeAspect="1" noChangeArrowheads="1"/>
+            </p:cNvPicPr>
+            <p:nvPr/>
+          </p:nvPicPr>
+          <p:blipFill rotWithShape="1">
+            <a:blip r:embed="rId2">
+              <a:extLst>
+                <a:ext uri="{28A0092B-C50C-407E-A947-70E740481C1C}">
+                  <a14:useLocalDpi xmlns:a14="http://schemas.microsoft.com/office/drawing/2010/main" val="0"/>
+                </a:ext>
+              </a:extLst>
+            </a:blip>
+            <a:srcRect r="78606" b="83294"/>
+            <a:stretch/>
+          </p:blipFill>
+          <p:spPr bwMode="auto">
+            <a:xfrm>
+              <a:off x="323528" y="1268760"/>
+              <a:ext cx="2783656" cy="1222063"/>
+            </a:xfrm>
+            <a:prstGeom prst="rect">
+              <a:avLst/>
+            </a:prstGeom>
+            <a:noFill/>
+            <a:ln>
+              <a:noFill/>
+            </a:ln>
+            <a:extLst>
+              <a:ext uri="{909E8E84-426E-40DD-AFC4-6F175D3DCCD1}">
+                <a14:hiddenFill xmlns:a14="http://schemas.microsoft.com/office/drawing/2010/main">
+                  <a:solidFill>
+                    <a:schemeClr val="accent1"/>
+                  </a:solidFill>
+                </a14:hiddenFill>
+              </a:ext>
+              <a:ext uri="{91240B29-F687-4F45-9708-019B960494DF}">
+                <a14:hiddenLine xmlns:a14="http://schemas.microsoft.com/office/drawing/2010/main" w="9525">
+                  <a:solidFill>
+                    <a:schemeClr val="tx1"/>
+                  </a:solidFill>
+                  <a:miter lim="800000"/>
+                  <a:headEnd/>
+                  <a:tailEnd/>
+                </a14:hiddenLine>
+              </a:ext>
+            </a:extLst>
+          </p:spPr>
+        </p:pic>
+        <p:sp>
+          <p:nvSpPr>
+            <p:cNvPr id="4" name="Rectangle 3"/>
+            <p:cNvSpPr/>
+            <p:nvPr/>
+          </p:nvSpPr>
+          <p:spPr>
+            <a:xfrm>
+              <a:off x="323528" y="1268760"/>
+              <a:ext cx="3919945" cy="3365846"/>
+            </a:xfrm>
+            <a:prstGeom prst="rect">
+              <a:avLst/>
+            </a:prstGeom>
+            <a:noFill/>
+            <a:ln w="38100">
+              <a:solidFill>
+                <a:schemeClr val="bg1">
+                  <a:lumMod val="65000"/>
+                </a:schemeClr>
+              </a:solidFill>
+              <a:prstDash val="dash"/>
+            </a:ln>
+          </p:spPr>
+          <p:style>
+            <a:lnRef idx="2">
+              <a:schemeClr val="accent1">
+                <a:shade val="50000"/>
+              </a:schemeClr>
+            </a:lnRef>
+            <a:fillRef idx="1">
+              <a:schemeClr val="accent1"/>
+            </a:fillRef>
+            <a:effectRef idx="0">
+              <a:schemeClr val="accent1"/>
+            </a:effectRef>
+            <a:fontRef idx="minor">
+              <a:schemeClr val="lt1"/>
+            </a:fontRef>
+          </p:style>
+          <p:txBody>
+            <a:bodyPr rtlCol="0" anchor="ctr"/>
+            <a:lstStyle/>
+            <a:p>
+              <a:pPr algn="ctr"/>
+              <a:endParaRPr lang="en-GB"/>
+            </a:p>
+          </p:txBody>
+        </p:sp>
+      </p:grpSp>
+      <p:pic>
+        <p:nvPicPr>
+          <p:cNvPr id="6" name="Picture 5"/>
+          <p:cNvPicPr/>
+          <p:nvPr/>
+        </p:nvPicPr>
+        <p:blipFill rotWithShape="1">
+          <a:blip r:embed="rId3"/>
+          <a:srcRect r="57595" b="61269"/>
+          <a:stretch/>
+        </p:blipFill>
+        <p:spPr>
+          <a:xfrm>
+            <a:off x="4357999" y="2460950"/>
+            <a:ext cx="4392488" cy="2793848"/>
+          </a:xfrm>
+          <a:prstGeom prst="rect">
+            <a:avLst/>
+          </a:prstGeom>
+        </p:spPr>
+      </p:pic>
+      <p:sp>
+        <p:nvSpPr>
+          <p:cNvPr id="7" name="Oval 6"/>
+          <p:cNvSpPr/>
+          <p:nvPr/>
+        </p:nvSpPr>
+        <p:spPr>
+          <a:xfrm>
+            <a:off x="1715354" y="5254798"/>
+            <a:ext cx="696406" cy="190426"/>
+          </a:xfrm>
+          <a:prstGeom prst="ellipse">
+            <a:avLst/>
+          </a:prstGeom>
+          <a:noFill/>
+          <a:ln>
+            <a:solidFill>
+              <a:srgbClr val="FF0000"/>
+            </a:solidFill>
+          </a:ln>
+        </p:spPr>
+        <p:style>
+          <a:lnRef idx="2">
+            <a:schemeClr val="accent1">
+              <a:shade val="50000"/>
+            </a:schemeClr>
+          </a:lnRef>
+          <a:fillRef idx="1">
+            <a:schemeClr val="accent1"/>
+          </a:fillRef>
+          <a:effectRef idx="0">
+            <a:schemeClr val="accent1"/>
+          </a:effectRef>
+          <a:fontRef idx="minor">
+            <a:schemeClr val="lt1"/>
+          </a:fontRef>
+        </p:style>
+        <p:txBody>
+          <a:bodyPr rtlCol="0" anchor="ctr"/>
+          <a:lstStyle/>
+          <a:p>
+            <a:pPr algn="ctr"/>
+            <a:endParaRPr lang="en-GB"/>
+          </a:p>
+        </p:txBody>
+      </p:sp>
+      <p:cxnSp>
+        <p:nvCxnSpPr>
+          <p:cNvPr id="9" name="Straight Arrow Connector 8"/>
+          <p:cNvCxnSpPr/>
+          <p:nvPr/>
+        </p:nvCxnSpPr>
+        <p:spPr>
+          <a:xfrm flipH="1" flipV="1">
+            <a:off x="2411760" y="5350011"/>
+            <a:ext cx="1008112" cy="743285"/>
+          </a:xfrm>
+          <a:prstGeom prst="straightConnector1">
+            <a:avLst/>
+          </a:prstGeom>
+          <a:ln>
+            <a:solidFill>
+              <a:srgbClr val="FF0000"/>
+            </a:solidFill>
+            <a:tailEnd type="arrow"/>
+          </a:ln>
+        </p:spPr>
+        <p:style>
+          <a:lnRef idx="1">
+            <a:schemeClr val="accent1"/>
+          </a:lnRef>
+          <a:fillRef idx="0">
+            <a:schemeClr val="accent1"/>
+          </a:fillRef>
+          <a:effectRef idx="0">
+            <a:schemeClr val="accent1"/>
+          </a:effectRef>
+          <a:fontRef idx="minor">
+            <a:schemeClr val="tx1"/>
+          </a:fontRef>
+        </p:style>
+      </p:cxnSp>
+      <p:sp>
+        <p:nvSpPr>
+          <p:cNvPr id="12" name="TextBox 11"/>
+          <p:cNvSpPr txBox="1"/>
+          <p:nvPr/>
+        </p:nvSpPr>
+        <p:spPr>
+          <a:xfrm>
+            <a:off x="2915816" y="6093296"/>
+            <a:ext cx="4536504" cy="369332"/>
+          </a:xfrm>
+          <a:prstGeom prst="rect">
+            <a:avLst/>
+          </a:prstGeom>
+          <a:noFill/>
+        </p:spPr>
+        <p:txBody>
+          <a:bodyPr wrap="square" rtlCol="0">
+            <a:spAutoFit/>
+          </a:bodyPr>
+          <a:lstStyle/>
+          <a:p>
+            <a:r>
+              <a:rPr lang="en-GB" dirty="0" smtClean="0"/>
+              <a:t>Selecting this should open a </a:t>
+            </a:r>
+            <a:r>
+              <a:rPr lang="en-GB" dirty="0" smtClean="0">
+                <a:solidFill>
+                  <a:srgbClr val="FF0000"/>
+                </a:solidFill>
+              </a:rPr>
+              <a:t>new</a:t>
+            </a:r>
+            <a:r>
+              <a:rPr lang="en-GB" dirty="0" smtClean="0"/>
+              <a:t> tab/window</a:t>
+            </a:r>
+            <a:endParaRPr lang="en-GB" dirty="0"/>
+          </a:p>
+        </p:txBody>
+      </p:sp>
+      <p:cxnSp>
+        <p:nvCxnSpPr>
+          <p:cNvPr id="14" name="Straight Arrow Connector 13"/>
+          <p:cNvCxnSpPr/>
+          <p:nvPr/>
+        </p:nvCxnSpPr>
+        <p:spPr>
+          <a:xfrm flipH="1" flipV="1">
+            <a:off x="4860032" y="2708921"/>
+            <a:ext cx="1008112" cy="3384375"/>
+          </a:xfrm>
+          <a:prstGeom prst="straightConnector1">
+            <a:avLst/>
+          </a:prstGeom>
+          <a:ln>
+            <a:solidFill>
+              <a:srgbClr val="FF0000"/>
+            </a:solidFill>
+            <a:tailEnd type="arrow"/>
+          </a:ln>
+        </p:spPr>
+        <p:style>
+          <a:lnRef idx="1">
+            <a:schemeClr val="accent1"/>
+          </a:lnRef>
+          <a:fillRef idx="0">
+            <a:schemeClr val="accent1"/>
+          </a:fillRef>
+          <a:effectRef idx="0">
+            <a:schemeClr val="accent1"/>
+          </a:effectRef>
+          <a:fontRef idx="minor">
+            <a:schemeClr val="tx1"/>
+          </a:fontRef>
+        </p:style>
+      </p:cxnSp>
+    </p:spTree>
+    <p:extLst>
+      <p:ext uri="{BB962C8B-B14F-4D97-AF65-F5344CB8AC3E}">
+        <p14:creationId xmlns:p14="http://schemas.microsoft.com/office/powerpoint/2010/main" val="4263665318"/>
+      </p:ext>
+    </p:extLst>
+  </p:cSld>
+  <p:clrMapOvr>
+    <a:masterClrMapping/>
+  </p:clrMapOvr>
+  <p:timing>
+    <p:tnLst>
+      <p:par>
+        <p:cTn id="1" dur="indefinite" restart="never" nodeType="tmRoot"/>
+      </p:par>
+    </p:tnLst>
+  </p:timing>
 </p:sld>
 </file>
 

</xml_diff>